<commit_message>
[clean] deleted redundant pages from the PowerPoint
Signed-off-by: Sewoon Park <seuni.park@samsung.com>
</commit_message>
<xml_diff>
--- a/BOYSCOUT_PT.pptx
+++ b/BOYSCOUT_PT.pptx
@@ -5,7 +5,7 @@
     <p:sldMasterId id="2147483648" r:id="rId1"/>
   </p:sldMasterIdLst>
   <p:notesMasterIdLst>
-    <p:notesMasterId r:id="rId26"/>
+    <p:notesMasterId r:id="rId24"/>
   </p:notesMasterIdLst>
   <p:sldIdLst>
     <p:sldId id="256" r:id="rId2"/>
@@ -21,17 +21,15 @@
     <p:sldId id="283" r:id="rId12"/>
     <p:sldId id="293" r:id="rId13"/>
     <p:sldId id="295" r:id="rId14"/>
-    <p:sldId id="296" r:id="rId15"/>
-    <p:sldId id="266" r:id="rId16"/>
-    <p:sldId id="258" r:id="rId17"/>
-    <p:sldId id="268" r:id="rId18"/>
-    <p:sldId id="273" r:id="rId19"/>
-    <p:sldId id="288" r:id="rId20"/>
-    <p:sldId id="289" r:id="rId21"/>
-    <p:sldId id="290" r:id="rId22"/>
-    <p:sldId id="271" r:id="rId23"/>
-    <p:sldId id="272" r:id="rId24"/>
-    <p:sldId id="276" r:id="rId25"/>
+    <p:sldId id="266" r:id="rId15"/>
+    <p:sldId id="258" r:id="rId16"/>
+    <p:sldId id="268" r:id="rId17"/>
+    <p:sldId id="288" r:id="rId18"/>
+    <p:sldId id="289" r:id="rId19"/>
+    <p:sldId id="290" r:id="rId20"/>
+    <p:sldId id="271" r:id="rId21"/>
+    <p:sldId id="272" r:id="rId22"/>
+    <p:sldId id="276" r:id="rId23"/>
   </p:sldIdLst>
   <p:sldSz cx="12192000" cy="6858000"/>
   <p:notesSz cx="6858000" cy="9144000"/>
@@ -269,7 +267,7 @@
       <p15:sldGuideLst xmlns:p15="http://schemas.microsoft.com/office/powerpoint/2012/main"/>
     </p:ext>
     <p:ext uri="GoogleSlidesCustomDataVersion2">
-      <go:slidesCustomData xmlns="" xmlns:mc="http://schemas.openxmlformats.org/markup-compatibility/2006" xmlns:mv="urn:schemas-microsoft-com:mac:vml" xmlns:c="http://schemas.openxmlformats.org/drawingml/2006/chart" xmlns:dgm="http://schemas.openxmlformats.org/drawingml/2006/diagram" xmlns:o="urn:schemas-microsoft-com:office:office" xmlns:v="urn:schemas-microsoft-com:vml" xmlns:pvml="urn:schemas-microsoft-com:office:powerpoint" xmlns:com="http://schemas.openxmlformats.org/drawingml/2006/compatibility" xmlns:p14="http://schemas.microsoft.com/office/powerpoint/2010/main" xmlns:p15="http://schemas.microsoft.com/office/powerpoint/2012/main" xmlns:ahyp="http://schemas.microsoft.com/office/drawing/2018/hyperlinkcolor" xmlns:go="http://customooxmlschemas.google.com/" r:id="rId27" roundtripDataSignature="AMtx7mj5GdbxsaFl02bTEFBl/9s84/Z/Bw=="/>
+      <go:slidesCustomData xmlns:go="http://customooxmlschemas.google.com/" xmlns:ahyp="http://schemas.microsoft.com/office/drawing/2018/hyperlinkcolor" xmlns:p15="http://schemas.microsoft.com/office/powerpoint/2012/main" xmlns:p14="http://schemas.microsoft.com/office/powerpoint/2010/main" xmlns:com="http://schemas.openxmlformats.org/drawingml/2006/compatibility" xmlns:pvml="urn:schemas-microsoft-com:office:powerpoint" xmlns:v="urn:schemas-microsoft-com:vml" xmlns:o="urn:schemas-microsoft-com:office:office" xmlns:dgm="http://schemas.openxmlformats.org/drawingml/2006/diagram" xmlns:c="http://schemas.openxmlformats.org/drawingml/2006/chart" xmlns:mv="urn:schemas-microsoft-com:mac:vml" xmlns:mc="http://schemas.openxmlformats.org/markup-compatibility/2006" xmlns="" r:id="rId27" roundtripDataSignature="AMtx7mj5GdbxsaFl02bTEFBl/9s84/Z/Bw=="/>
     </p:ext>
   </p:extLst>
 </p:presentation>
@@ -1261,115 +1259,6 @@
   <p:cSld>
     <p:spTree>
       <p:nvGrpSpPr>
-        <p:cNvPr id="1" name="Shape 55"/>
-        <p:cNvGrpSpPr/>
-        <p:nvPr/>
-      </p:nvGrpSpPr>
-      <p:grpSpPr>
-        <a:xfrm>
-          <a:off x="0" y="0"/>
-          <a:ext cx="0" cy="0"/>
-          <a:chOff x="0" y="0"/>
-          <a:chExt cx="0" cy="0"/>
-        </a:xfrm>
-      </p:grpSpPr>
-      <p:sp>
-        <p:nvSpPr>
-          <p:cNvPr id="56" name="Google Shape;56;p3:notes"/>
-          <p:cNvSpPr txBox="1">
-            <a:spLocks noGrp="1"/>
-          </p:cNvSpPr>
-          <p:nvPr>
-            <p:ph type="body" idx="1"/>
-          </p:nvPr>
-        </p:nvSpPr>
-        <p:spPr>
-          <a:xfrm>
-            <a:off x="685800" y="4343400"/>
-            <a:ext cx="5486400" cy="4114800"/>
-          </a:xfrm>
-          <a:prstGeom prst="rect">
-            <a:avLst/>
-          </a:prstGeom>
-        </p:spPr>
-        <p:txBody>
-          <a:bodyPr spcFirstLastPara="1" wrap="square" lIns="91425" tIns="91425" rIns="91425" bIns="91425" anchor="t" anchorCtr="0">
-            <a:noAutofit/>
-          </a:bodyPr>
-          <a:lstStyle/>
-          <a:p>
-            <a:pPr marL="0" lvl="0" indent="0" algn="l" rtl="0">
-              <a:spcBef>
-                <a:spcPts val="0"/>
-              </a:spcBef>
-              <a:spcAft>
-                <a:spcPts val="0"/>
-              </a:spcAft>
-              <a:buNone/>
-            </a:pPr>
-            <a:endParaRPr/>
-          </a:p>
-        </p:txBody>
-      </p:sp>
-      <p:sp>
-        <p:nvSpPr>
-          <p:cNvPr id="57" name="Google Shape;57;p3:notes"/>
-          <p:cNvSpPr>
-            <a:spLocks noGrp="1" noRot="1" noChangeAspect="1"/>
-          </p:cNvSpPr>
-          <p:nvPr>
-            <p:ph type="sldImg" idx="2"/>
-          </p:nvPr>
-        </p:nvSpPr>
-        <p:spPr>
-          <a:xfrm>
-            <a:off x="381000" y="685800"/>
-            <a:ext cx="6096000" cy="3429000"/>
-          </a:xfrm>
-          <a:custGeom>
-            <a:avLst/>
-            <a:gdLst/>
-            <a:ahLst/>
-            <a:cxnLst/>
-            <a:rect l="l" t="t" r="r" b="b"/>
-            <a:pathLst>
-              <a:path w="120000" h="120000" extrusionOk="0">
-                <a:moveTo>
-                  <a:pt x="0" y="0"/>
-                </a:moveTo>
-                <a:lnTo>
-                  <a:pt x="120000" y="0"/>
-                </a:lnTo>
-                <a:lnTo>
-                  <a:pt x="120000" y="120000"/>
-                </a:lnTo>
-                <a:lnTo>
-                  <a:pt x="0" y="120000"/>
-                </a:lnTo>
-                <a:close/>
-              </a:path>
-            </a:pathLst>
-          </a:custGeom>
-        </p:spPr>
-      </p:sp>
-    </p:spTree>
-    <p:extLst>
-      <p:ext uri="{BB962C8B-B14F-4D97-AF65-F5344CB8AC3E}">
-        <p14:creationId xmlns:p14="http://schemas.microsoft.com/office/powerpoint/2010/main" val="2824543150"/>
-      </p:ext>
-    </p:extLst>
-  </p:cSld>
-  <p:clrMapOvr>
-    <a:masterClrMapping/>
-  </p:clrMapOvr>
-</p:notes>
-</file>
-
-<file path=ppt/notesSlides/notesSlide15.xml><?xml version="1.0" encoding="utf-8"?>
-<p:notes xmlns:a="http://schemas.openxmlformats.org/drawingml/2006/main" xmlns:r="http://schemas.openxmlformats.org/officeDocument/2006/relationships" xmlns:p="http://schemas.openxmlformats.org/presentationml/2006/main" showMasterSp="0" showMasterPhAnim="0">
-  <p:cSld>
-    <p:spTree>
-      <p:nvGrpSpPr>
         <p:cNvPr id="1" name="Shape 50"/>
         <p:cNvGrpSpPr/>
         <p:nvPr/>
@@ -1474,7 +1363,7 @@
 </p:notes>
 </file>
 
-<file path=ppt/notesSlides/notesSlide16.xml><?xml version="1.0" encoding="utf-8"?>
+<file path=ppt/notesSlides/notesSlide15.xml><?xml version="1.0" encoding="utf-8"?>
 <p:notes xmlns:a="http://schemas.openxmlformats.org/drawingml/2006/main" xmlns:r="http://schemas.openxmlformats.org/officeDocument/2006/relationships" xmlns:p="http://schemas.openxmlformats.org/presentationml/2006/main" showMasterSp="0" showMasterPhAnim="0">
   <p:cSld>
     <p:spTree>
@@ -1578,7 +1467,7 @@
 </p:notes>
 </file>
 
-<file path=ppt/notesSlides/notesSlide17.xml><?xml version="1.0" encoding="utf-8"?>
+<file path=ppt/notesSlides/notesSlide16.xml><?xml version="1.0" encoding="utf-8"?>
 <p:notes xmlns:a="http://schemas.openxmlformats.org/drawingml/2006/main" xmlns:r="http://schemas.openxmlformats.org/officeDocument/2006/relationships" xmlns:p="http://schemas.openxmlformats.org/presentationml/2006/main" showMasterSp="0" showMasterPhAnim="0">
   <p:cSld>
     <p:spTree>
@@ -1687,7 +1576,7 @@
 </p:notes>
 </file>
 
-<file path=ppt/notesSlides/notesSlide18.xml><?xml version="1.0" encoding="utf-8"?>
+<file path=ppt/notesSlides/notesSlide17.xml><?xml version="1.0" encoding="utf-8"?>
 <p:notes xmlns:a="http://schemas.openxmlformats.org/drawingml/2006/main" xmlns:r="http://schemas.openxmlformats.org/officeDocument/2006/relationships" xmlns:p="http://schemas.openxmlformats.org/presentationml/2006/main" showMasterSp="0" showMasterPhAnim="0">
   <p:cSld>
     <p:spTree>
@@ -1786,7 +1675,116 @@
     </p:spTree>
     <p:extLst>
       <p:ext uri="{BB962C8B-B14F-4D97-AF65-F5344CB8AC3E}">
-        <p14:creationId xmlns:p14="http://schemas.microsoft.com/office/powerpoint/2010/main" val="940877347"/>
+        <p14:creationId xmlns:p14="http://schemas.microsoft.com/office/powerpoint/2010/main" val="1017260372"/>
+      </p:ext>
+    </p:extLst>
+  </p:cSld>
+  <p:clrMapOvr>
+    <a:masterClrMapping/>
+  </p:clrMapOvr>
+</p:notes>
+</file>
+
+<file path=ppt/notesSlides/notesSlide18.xml><?xml version="1.0" encoding="utf-8"?>
+<p:notes xmlns:a="http://schemas.openxmlformats.org/drawingml/2006/main" xmlns:r="http://schemas.openxmlformats.org/officeDocument/2006/relationships" xmlns:p="http://schemas.openxmlformats.org/presentationml/2006/main" showMasterSp="0" showMasterPhAnim="0">
+  <p:cSld>
+    <p:spTree>
+      <p:nvGrpSpPr>
+        <p:cNvPr id="1" name="Shape 55"/>
+        <p:cNvGrpSpPr/>
+        <p:nvPr/>
+      </p:nvGrpSpPr>
+      <p:grpSpPr>
+        <a:xfrm>
+          <a:off x="0" y="0"/>
+          <a:ext cx="0" cy="0"/>
+          <a:chOff x="0" y="0"/>
+          <a:chExt cx="0" cy="0"/>
+        </a:xfrm>
+      </p:grpSpPr>
+      <p:sp>
+        <p:nvSpPr>
+          <p:cNvPr id="56" name="Google Shape;56;p3:notes"/>
+          <p:cNvSpPr txBox="1">
+            <a:spLocks noGrp="1"/>
+          </p:cNvSpPr>
+          <p:nvPr>
+            <p:ph type="body" idx="1"/>
+          </p:nvPr>
+        </p:nvSpPr>
+        <p:spPr>
+          <a:xfrm>
+            <a:off x="685800" y="4343400"/>
+            <a:ext cx="5486400" cy="4114800"/>
+          </a:xfrm>
+          <a:prstGeom prst="rect">
+            <a:avLst/>
+          </a:prstGeom>
+        </p:spPr>
+        <p:txBody>
+          <a:bodyPr spcFirstLastPara="1" wrap="square" lIns="91425" tIns="91425" rIns="91425" bIns="91425" anchor="t" anchorCtr="0">
+            <a:noAutofit/>
+          </a:bodyPr>
+          <a:lstStyle/>
+          <a:p>
+            <a:pPr marL="0" lvl="0" indent="0" algn="l" rtl="0">
+              <a:spcBef>
+                <a:spcPts val="0"/>
+              </a:spcBef>
+              <a:spcAft>
+                <a:spcPts val="0"/>
+              </a:spcAft>
+              <a:buNone/>
+            </a:pPr>
+            <a:endParaRPr/>
+          </a:p>
+        </p:txBody>
+      </p:sp>
+      <p:sp>
+        <p:nvSpPr>
+          <p:cNvPr id="57" name="Google Shape;57;p3:notes"/>
+          <p:cNvSpPr>
+            <a:spLocks noGrp="1" noRot="1" noChangeAspect="1"/>
+          </p:cNvSpPr>
+          <p:nvPr>
+            <p:ph type="sldImg" idx="2"/>
+          </p:nvPr>
+        </p:nvSpPr>
+        <p:spPr>
+          <a:xfrm>
+            <a:off x="381000" y="685800"/>
+            <a:ext cx="6096000" cy="3429000"/>
+          </a:xfrm>
+          <a:custGeom>
+            <a:avLst/>
+            <a:gdLst/>
+            <a:ahLst/>
+            <a:cxnLst/>
+            <a:rect l="l" t="t" r="r" b="b"/>
+            <a:pathLst>
+              <a:path w="120000" h="120000" extrusionOk="0">
+                <a:moveTo>
+                  <a:pt x="0" y="0"/>
+                </a:moveTo>
+                <a:lnTo>
+                  <a:pt x="120000" y="0"/>
+                </a:lnTo>
+                <a:lnTo>
+                  <a:pt x="120000" y="120000"/>
+                </a:lnTo>
+                <a:lnTo>
+                  <a:pt x="0" y="120000"/>
+                </a:lnTo>
+                <a:close/>
+              </a:path>
+            </a:pathLst>
+          </a:custGeom>
+        </p:spPr>
+      </p:sp>
+    </p:spTree>
+    <p:extLst>
+      <p:ext uri="{BB962C8B-B14F-4D97-AF65-F5344CB8AC3E}">
+        <p14:creationId xmlns:p14="http://schemas.microsoft.com/office/powerpoint/2010/main" val="1590070888"/>
       </p:ext>
     </p:extLst>
   </p:cSld>
@@ -1895,7 +1893,7 @@
     </p:spTree>
     <p:extLst>
       <p:ext uri="{BB962C8B-B14F-4D97-AF65-F5344CB8AC3E}">
-        <p14:creationId xmlns:p14="http://schemas.microsoft.com/office/powerpoint/2010/main" val="1017260372"/>
+        <p14:creationId xmlns:p14="http://schemas.microsoft.com/office/powerpoint/2010/main" val="212436244"/>
       </p:ext>
     </p:extLst>
   </p:cSld>
@@ -2019,224 +2017,6 @@
   <p:cSld>
     <p:spTree>
       <p:nvGrpSpPr>
-        <p:cNvPr id="1" name="Shape 55"/>
-        <p:cNvGrpSpPr/>
-        <p:nvPr/>
-      </p:nvGrpSpPr>
-      <p:grpSpPr>
-        <a:xfrm>
-          <a:off x="0" y="0"/>
-          <a:ext cx="0" cy="0"/>
-          <a:chOff x="0" y="0"/>
-          <a:chExt cx="0" cy="0"/>
-        </a:xfrm>
-      </p:grpSpPr>
-      <p:sp>
-        <p:nvSpPr>
-          <p:cNvPr id="56" name="Google Shape;56;p3:notes"/>
-          <p:cNvSpPr txBox="1">
-            <a:spLocks noGrp="1"/>
-          </p:cNvSpPr>
-          <p:nvPr>
-            <p:ph type="body" idx="1"/>
-          </p:nvPr>
-        </p:nvSpPr>
-        <p:spPr>
-          <a:xfrm>
-            <a:off x="685800" y="4343400"/>
-            <a:ext cx="5486400" cy="4114800"/>
-          </a:xfrm>
-          <a:prstGeom prst="rect">
-            <a:avLst/>
-          </a:prstGeom>
-        </p:spPr>
-        <p:txBody>
-          <a:bodyPr spcFirstLastPara="1" wrap="square" lIns="91425" tIns="91425" rIns="91425" bIns="91425" anchor="t" anchorCtr="0">
-            <a:noAutofit/>
-          </a:bodyPr>
-          <a:lstStyle/>
-          <a:p>
-            <a:pPr marL="0" lvl="0" indent="0" algn="l" rtl="0">
-              <a:spcBef>
-                <a:spcPts val="0"/>
-              </a:spcBef>
-              <a:spcAft>
-                <a:spcPts val="0"/>
-              </a:spcAft>
-              <a:buNone/>
-            </a:pPr>
-            <a:endParaRPr/>
-          </a:p>
-        </p:txBody>
-      </p:sp>
-      <p:sp>
-        <p:nvSpPr>
-          <p:cNvPr id="57" name="Google Shape;57;p3:notes"/>
-          <p:cNvSpPr>
-            <a:spLocks noGrp="1" noRot="1" noChangeAspect="1"/>
-          </p:cNvSpPr>
-          <p:nvPr>
-            <p:ph type="sldImg" idx="2"/>
-          </p:nvPr>
-        </p:nvSpPr>
-        <p:spPr>
-          <a:xfrm>
-            <a:off x="381000" y="685800"/>
-            <a:ext cx="6096000" cy="3429000"/>
-          </a:xfrm>
-          <a:custGeom>
-            <a:avLst/>
-            <a:gdLst/>
-            <a:ahLst/>
-            <a:cxnLst/>
-            <a:rect l="l" t="t" r="r" b="b"/>
-            <a:pathLst>
-              <a:path w="120000" h="120000" extrusionOk="0">
-                <a:moveTo>
-                  <a:pt x="0" y="0"/>
-                </a:moveTo>
-                <a:lnTo>
-                  <a:pt x="120000" y="0"/>
-                </a:lnTo>
-                <a:lnTo>
-                  <a:pt x="120000" y="120000"/>
-                </a:lnTo>
-                <a:lnTo>
-                  <a:pt x="0" y="120000"/>
-                </a:lnTo>
-                <a:close/>
-              </a:path>
-            </a:pathLst>
-          </a:custGeom>
-        </p:spPr>
-      </p:sp>
-    </p:spTree>
-    <p:extLst>
-      <p:ext uri="{BB962C8B-B14F-4D97-AF65-F5344CB8AC3E}">
-        <p14:creationId xmlns:p14="http://schemas.microsoft.com/office/powerpoint/2010/main" val="1590070888"/>
-      </p:ext>
-    </p:extLst>
-  </p:cSld>
-  <p:clrMapOvr>
-    <a:masterClrMapping/>
-  </p:clrMapOvr>
-</p:notes>
-</file>
-
-<file path=ppt/notesSlides/notesSlide21.xml><?xml version="1.0" encoding="utf-8"?>
-<p:notes xmlns:a="http://schemas.openxmlformats.org/drawingml/2006/main" xmlns:r="http://schemas.openxmlformats.org/officeDocument/2006/relationships" xmlns:p="http://schemas.openxmlformats.org/presentationml/2006/main" showMasterSp="0" showMasterPhAnim="0">
-  <p:cSld>
-    <p:spTree>
-      <p:nvGrpSpPr>
-        <p:cNvPr id="1" name="Shape 55"/>
-        <p:cNvGrpSpPr/>
-        <p:nvPr/>
-      </p:nvGrpSpPr>
-      <p:grpSpPr>
-        <a:xfrm>
-          <a:off x="0" y="0"/>
-          <a:ext cx="0" cy="0"/>
-          <a:chOff x="0" y="0"/>
-          <a:chExt cx="0" cy="0"/>
-        </a:xfrm>
-      </p:grpSpPr>
-      <p:sp>
-        <p:nvSpPr>
-          <p:cNvPr id="56" name="Google Shape;56;p3:notes"/>
-          <p:cNvSpPr txBox="1">
-            <a:spLocks noGrp="1"/>
-          </p:cNvSpPr>
-          <p:nvPr>
-            <p:ph type="body" idx="1"/>
-          </p:nvPr>
-        </p:nvSpPr>
-        <p:spPr>
-          <a:xfrm>
-            <a:off x="685800" y="4343400"/>
-            <a:ext cx="5486400" cy="4114800"/>
-          </a:xfrm>
-          <a:prstGeom prst="rect">
-            <a:avLst/>
-          </a:prstGeom>
-        </p:spPr>
-        <p:txBody>
-          <a:bodyPr spcFirstLastPara="1" wrap="square" lIns="91425" tIns="91425" rIns="91425" bIns="91425" anchor="t" anchorCtr="0">
-            <a:noAutofit/>
-          </a:bodyPr>
-          <a:lstStyle/>
-          <a:p>
-            <a:pPr marL="0" lvl="0" indent="0" algn="l" rtl="0">
-              <a:spcBef>
-                <a:spcPts val="0"/>
-              </a:spcBef>
-              <a:spcAft>
-                <a:spcPts val="0"/>
-              </a:spcAft>
-              <a:buNone/>
-            </a:pPr>
-            <a:endParaRPr/>
-          </a:p>
-        </p:txBody>
-      </p:sp>
-      <p:sp>
-        <p:nvSpPr>
-          <p:cNvPr id="57" name="Google Shape;57;p3:notes"/>
-          <p:cNvSpPr>
-            <a:spLocks noGrp="1" noRot="1" noChangeAspect="1"/>
-          </p:cNvSpPr>
-          <p:nvPr>
-            <p:ph type="sldImg" idx="2"/>
-          </p:nvPr>
-        </p:nvSpPr>
-        <p:spPr>
-          <a:xfrm>
-            <a:off x="381000" y="685800"/>
-            <a:ext cx="6096000" cy="3429000"/>
-          </a:xfrm>
-          <a:custGeom>
-            <a:avLst/>
-            <a:gdLst/>
-            <a:ahLst/>
-            <a:cxnLst/>
-            <a:rect l="l" t="t" r="r" b="b"/>
-            <a:pathLst>
-              <a:path w="120000" h="120000" extrusionOk="0">
-                <a:moveTo>
-                  <a:pt x="0" y="0"/>
-                </a:moveTo>
-                <a:lnTo>
-                  <a:pt x="120000" y="0"/>
-                </a:lnTo>
-                <a:lnTo>
-                  <a:pt x="120000" y="120000"/>
-                </a:lnTo>
-                <a:lnTo>
-                  <a:pt x="0" y="120000"/>
-                </a:lnTo>
-                <a:close/>
-              </a:path>
-            </a:pathLst>
-          </a:custGeom>
-        </p:spPr>
-      </p:sp>
-    </p:spTree>
-    <p:extLst>
-      <p:ext uri="{BB962C8B-B14F-4D97-AF65-F5344CB8AC3E}">
-        <p14:creationId xmlns:p14="http://schemas.microsoft.com/office/powerpoint/2010/main" val="212436244"/>
-      </p:ext>
-    </p:extLst>
-  </p:cSld>
-  <p:clrMapOvr>
-    <a:masterClrMapping/>
-  </p:clrMapOvr>
-</p:notes>
-</file>
-
-<file path=ppt/notesSlides/notesSlide22.xml><?xml version="1.0" encoding="utf-8"?>
-<p:notes xmlns:a="http://schemas.openxmlformats.org/drawingml/2006/main" xmlns:r="http://schemas.openxmlformats.org/officeDocument/2006/relationships" xmlns:p="http://schemas.openxmlformats.org/presentationml/2006/main" showMasterSp="0" showMasterPhAnim="0">
-  <p:cSld>
-    <p:spTree>
-      <p:nvGrpSpPr>
         <p:cNvPr id="1" name="Shape 50"/>
         <p:cNvGrpSpPr/>
         <p:nvPr/>
@@ -2341,7 +2121,7 @@
 </p:notes>
 </file>
 
-<file path=ppt/notesSlides/notesSlide23.xml><?xml version="1.0" encoding="utf-8"?>
+<file path=ppt/notesSlides/notesSlide21.xml><?xml version="1.0" encoding="utf-8"?>
 <p:notes xmlns:a="http://schemas.openxmlformats.org/drawingml/2006/main" xmlns:r="http://schemas.openxmlformats.org/officeDocument/2006/relationships" xmlns:p="http://schemas.openxmlformats.org/presentationml/2006/main" showMasterSp="0" showMasterPhAnim="0">
   <p:cSld>
     <p:spTree>
@@ -7457,8 +7237,24 @@
                 <a:effectLst/>
                 <a:latin typeface="-apple-system"/>
               </a:rPr>
-              <a:t>Best Practice - Clean Code</a:t>
+              <a:t>Best Practice – </a:t>
             </a:r>
+            <a:r>
+              <a:rPr lang="en-US" altLang="ko-KR" dirty="0">
+                <a:solidFill>
+                  <a:srgbClr val="1F2328"/>
+                </a:solidFill>
+                <a:latin typeface="-apple-system"/>
+              </a:rPr>
+              <a:t>TDD</a:t>
+            </a:r>
+            <a:endParaRPr lang="en-US" altLang="ko-KR" b="0" i="0" dirty="0">
+              <a:solidFill>
+                <a:srgbClr val="1F2328"/>
+              </a:solidFill>
+              <a:effectLst/>
+              <a:latin typeface="-apple-system"/>
+            </a:endParaRPr>
           </a:p>
         </p:txBody>
       </p:sp>
@@ -7676,62 +7472,7 @@
                 <a:effectLst/>
                 <a:latin typeface="-apple-system"/>
               </a:rPr>
-              <a:t>Best Practice - TDD/Mocking#1</a:t>
-            </a:r>
-          </a:p>
-        </p:txBody>
-      </p:sp>
-      <p:sp>
-        <p:nvSpPr>
-          <p:cNvPr id="4" name="TextBox 3">
-            <a:extLst>
-              <a:ext uri="{FF2B5EF4-FFF2-40B4-BE49-F238E27FC236}">
-                <a16:creationId xmlns:a16="http://schemas.microsoft.com/office/drawing/2014/main" id="{57A731A3-9C6F-43F5-A2A5-1A226569A809}"/>
-              </a:ext>
-            </a:extLst>
-          </p:cNvPr>
-          <p:cNvSpPr txBox="1"/>
-          <p:nvPr/>
-        </p:nvSpPr>
-        <p:spPr>
-          <a:xfrm>
-            <a:off x="3051810" y="3275112"/>
-            <a:ext cx="6103620" cy="307777"/>
-          </a:xfrm>
-          <a:prstGeom prst="rect">
-            <a:avLst/>
-          </a:prstGeom>
-          <a:noFill/>
-        </p:spPr>
-        <p:txBody>
-          <a:bodyPr wrap="square">
-            <a:spAutoFit/>
-          </a:bodyPr>
-          <a:lstStyle/>
-          <a:p>
-            <a:pPr algn="l">
-              <a:buFont typeface="+mj-lt"/>
-              <a:buAutoNum type="arabicPeriod"/>
-            </a:pPr>
-            <a:r>
-              <a:rPr lang="en-US" altLang="ko-KR" b="0" i="0" dirty="0" err="1">
-                <a:solidFill>
-                  <a:srgbClr val="1F2328"/>
-                </a:solidFill>
-                <a:effectLst/>
-                <a:latin typeface="-apple-system"/>
-              </a:rPr>
-              <a:t>BestPractice</a:t>
-            </a:r>
-            <a:r>
-              <a:rPr lang="en-US" altLang="ko-KR" b="0" i="0" dirty="0">
-                <a:solidFill>
-                  <a:srgbClr val="1F2328"/>
-                </a:solidFill>
-                <a:effectLst/>
-                <a:latin typeface="-apple-system"/>
-              </a:rPr>
-              <a:t> - TDD/Mocking</a:t>
+              <a:t>Best Practice - Mocking</a:t>
             </a:r>
           </a:p>
         </p:txBody>
@@ -7750,134 +7491,6 @@
 </file>
 
 <file path=ppt/slides/slide14.xml><?xml version="1.0" encoding="utf-8"?>
-<p:sld xmlns:a="http://schemas.openxmlformats.org/drawingml/2006/main" xmlns:r="http://schemas.openxmlformats.org/officeDocument/2006/relationships" xmlns:p="http://schemas.openxmlformats.org/presentationml/2006/main">
-  <p:cSld>
-    <p:spTree>
-      <p:nvGrpSpPr>
-        <p:cNvPr id="1" name="Shape 58"/>
-        <p:cNvGrpSpPr/>
-        <p:nvPr/>
-      </p:nvGrpSpPr>
-      <p:grpSpPr>
-        <a:xfrm>
-          <a:off x="0" y="0"/>
-          <a:ext cx="0" cy="0"/>
-          <a:chOff x="0" y="0"/>
-          <a:chExt cx="0" cy="0"/>
-        </a:xfrm>
-      </p:grpSpPr>
-      <p:sp>
-        <p:nvSpPr>
-          <p:cNvPr id="59" name="Google Shape;59;p3"/>
-          <p:cNvSpPr txBox="1">
-            <a:spLocks noGrp="1"/>
-          </p:cNvSpPr>
-          <p:nvPr>
-            <p:ph type="title"/>
-          </p:nvPr>
-        </p:nvSpPr>
-        <p:spPr>
-          <a:xfrm>
-            <a:off x="605980" y="310143"/>
-            <a:ext cx="10515600" cy="649800"/>
-          </a:xfrm>
-          <a:prstGeom prst="rect">
-            <a:avLst/>
-          </a:prstGeom>
-          <a:noFill/>
-          <a:ln>
-            <a:noFill/>
-          </a:ln>
-        </p:spPr>
-        <p:txBody>
-          <a:bodyPr spcFirstLastPara="1" wrap="square" lIns="91425" tIns="45700" rIns="91425" bIns="45700" anchor="ctr" anchorCtr="0">
-            <a:normAutofit fontScale="90000"/>
-          </a:bodyPr>
-          <a:lstStyle/>
-          <a:p>
-            <a:pPr algn="l"/>
-            <a:r>
-              <a:rPr lang="en-US" altLang="ko-KR" b="0" i="0" dirty="0">
-                <a:solidFill>
-                  <a:srgbClr val="1F2328"/>
-                </a:solidFill>
-                <a:effectLst/>
-                <a:latin typeface="-apple-system"/>
-              </a:rPr>
-              <a:t>Best Practice - TDD/Mocking#2</a:t>
-            </a:r>
-          </a:p>
-        </p:txBody>
-      </p:sp>
-      <p:sp>
-        <p:nvSpPr>
-          <p:cNvPr id="4" name="TextBox 3">
-            <a:extLst>
-              <a:ext uri="{FF2B5EF4-FFF2-40B4-BE49-F238E27FC236}">
-                <a16:creationId xmlns:a16="http://schemas.microsoft.com/office/drawing/2014/main" id="{57A731A3-9C6F-43F5-A2A5-1A226569A809}"/>
-              </a:ext>
-            </a:extLst>
-          </p:cNvPr>
-          <p:cNvSpPr txBox="1"/>
-          <p:nvPr/>
-        </p:nvSpPr>
-        <p:spPr>
-          <a:xfrm>
-            <a:off x="3051810" y="3275112"/>
-            <a:ext cx="6103620" cy="307777"/>
-          </a:xfrm>
-          <a:prstGeom prst="rect">
-            <a:avLst/>
-          </a:prstGeom>
-          <a:noFill/>
-        </p:spPr>
-        <p:txBody>
-          <a:bodyPr wrap="square">
-            <a:spAutoFit/>
-          </a:bodyPr>
-          <a:lstStyle/>
-          <a:p>
-            <a:pPr algn="l">
-              <a:buFont typeface="+mj-lt"/>
-              <a:buAutoNum type="arabicPeriod"/>
-            </a:pPr>
-            <a:r>
-              <a:rPr lang="en-US" altLang="ko-KR" b="0" i="0" dirty="0" err="1">
-                <a:solidFill>
-                  <a:srgbClr val="1F2328"/>
-                </a:solidFill>
-                <a:effectLst/>
-                <a:latin typeface="-apple-system"/>
-              </a:rPr>
-              <a:t>BestPractice</a:t>
-            </a:r>
-            <a:r>
-              <a:rPr lang="en-US" altLang="ko-KR" b="0" i="0" dirty="0">
-                <a:solidFill>
-                  <a:srgbClr val="1F2328"/>
-                </a:solidFill>
-                <a:effectLst/>
-                <a:latin typeface="-apple-system"/>
-              </a:rPr>
-              <a:t> - TDD/Mocking</a:t>
-            </a:r>
-          </a:p>
-        </p:txBody>
-      </p:sp>
-    </p:spTree>
-    <p:extLst>
-      <p:ext uri="{BB962C8B-B14F-4D97-AF65-F5344CB8AC3E}">
-        <p14:creationId xmlns:p14="http://schemas.microsoft.com/office/powerpoint/2010/main" val="697867617"/>
-      </p:ext>
-    </p:extLst>
-  </p:cSld>
-  <p:clrMapOvr>
-    <a:masterClrMapping/>
-  </p:clrMapOvr>
-</p:sld>
-</file>
-
-<file path=ppt/slides/slide15.xml><?xml version="1.0" encoding="utf-8"?>
 <p:sld xmlns:a="http://schemas.openxmlformats.org/drawingml/2006/main" xmlns:r="http://schemas.openxmlformats.org/officeDocument/2006/relationships" xmlns:p="http://schemas.openxmlformats.org/presentationml/2006/main">
   <p:cSld>
     <p:spTree>
@@ -8019,7 +7632,7 @@
 </p:sld>
 </file>
 
-<file path=ppt/slides/slide16.xml><?xml version="1.0" encoding="utf-8"?>
+<file path=ppt/slides/slide15.xml><?xml version="1.0" encoding="utf-8"?>
 <p:sld xmlns:a="http://schemas.openxmlformats.org/drawingml/2006/main" xmlns:r="http://schemas.openxmlformats.org/officeDocument/2006/relationships" xmlns:p="http://schemas.openxmlformats.org/presentationml/2006/main">
   <p:cSld>
     <p:spTree>
@@ -8083,8 +7696,24 @@
               <a:buNone/>
             </a:pPr>
             <a:r>
+              <a:rPr lang="en-US" altLang="ko-KR" dirty="0"/>
+              <a:t>Command Buffer </a:t>
+            </a:r>
+            <a:r>
               <a:rPr lang="ko-KR" altLang="en-US" dirty="0"/>
-              <a:t>적용 알고리즘 </a:t>
+              <a:t>알고리즘</a:t>
+            </a:r>
+            <a:r>
+              <a:rPr lang="en-US" altLang="ko-KR" dirty="0"/>
+              <a:t>(</a:t>
+            </a:r>
+            <a:r>
+              <a:rPr lang="ko-KR" altLang="en-US" dirty="0"/>
+              <a:t>세부</a:t>
+            </a:r>
+            <a:r>
+              <a:rPr lang="en-US" altLang="ko-KR" dirty="0"/>
+              <a:t>)</a:t>
             </a:r>
             <a:endParaRPr dirty="0"/>
           </a:p>
@@ -8098,7 +7727,7 @@
 </p:sld>
 </file>
 
-<file path=ppt/slides/slide17.xml><?xml version="1.0" encoding="utf-8"?>
+<file path=ppt/slides/slide16.xml><?xml version="1.0" encoding="utf-8"?>
 <p:sld xmlns:a="http://schemas.openxmlformats.org/drawingml/2006/main" xmlns:r="http://schemas.openxmlformats.org/officeDocument/2006/relationships" xmlns:p="http://schemas.openxmlformats.org/presentationml/2006/main">
   <p:cSld>
     <p:spTree>
@@ -8185,149 +7814,7 @@
 </p:sld>
 </file>
 
-<file path=ppt/slides/slide18.xml><?xml version="1.0" encoding="utf-8"?>
-<p:sld xmlns:a="http://schemas.openxmlformats.org/drawingml/2006/main" xmlns:r="http://schemas.openxmlformats.org/officeDocument/2006/relationships" xmlns:p="http://schemas.openxmlformats.org/presentationml/2006/main">
-  <p:cSld>
-    <p:spTree>
-      <p:nvGrpSpPr>
-        <p:cNvPr id="1" name="Shape 58"/>
-        <p:cNvGrpSpPr/>
-        <p:nvPr/>
-      </p:nvGrpSpPr>
-      <p:grpSpPr>
-        <a:xfrm>
-          <a:off x="0" y="0"/>
-          <a:ext cx="0" cy="0"/>
-          <a:chOff x="0" y="0"/>
-          <a:chExt cx="0" cy="0"/>
-        </a:xfrm>
-      </p:grpSpPr>
-      <p:sp>
-        <p:nvSpPr>
-          <p:cNvPr id="59" name="Google Shape;59;p3"/>
-          <p:cNvSpPr txBox="1">
-            <a:spLocks noGrp="1"/>
-          </p:cNvSpPr>
-          <p:nvPr>
-            <p:ph type="title"/>
-          </p:nvPr>
-        </p:nvSpPr>
-        <p:spPr>
-          <a:xfrm>
-            <a:off x="605980" y="310143"/>
-            <a:ext cx="10515600" cy="649800"/>
-          </a:xfrm>
-          <a:prstGeom prst="rect">
-            <a:avLst/>
-          </a:prstGeom>
-          <a:noFill/>
-          <a:ln>
-            <a:noFill/>
-          </a:ln>
-        </p:spPr>
-        <p:txBody>
-          <a:bodyPr spcFirstLastPara="1" wrap="square" lIns="91425" tIns="45700" rIns="91425" bIns="45700" anchor="ctr" anchorCtr="0">
-            <a:normAutofit fontScale="90000"/>
-          </a:bodyPr>
-          <a:lstStyle/>
-          <a:p>
-            <a:pPr marL="0" lvl="0" indent="0" algn="l" rtl="0">
-              <a:lnSpc>
-                <a:spcPct val="90000"/>
-              </a:lnSpc>
-              <a:spcBef>
-                <a:spcPts val="0"/>
-              </a:spcBef>
-              <a:spcAft>
-                <a:spcPts val="0"/>
-              </a:spcAft>
-              <a:buClr>
-                <a:schemeClr val="dk1"/>
-              </a:buClr>
-              <a:buSzPts val="4400"/>
-              <a:buFont typeface="Malgun Gothic"/>
-              <a:buNone/>
-            </a:pPr>
-            <a:r>
-              <a:rPr lang="en-US" dirty="0"/>
-              <a:t>SRP – </a:t>
-            </a:r>
-            <a:r>
-              <a:rPr lang="en-US" dirty="0" err="1"/>
-              <a:t>CommandParser</a:t>
-            </a:r>
-            <a:r>
-              <a:rPr lang="en-US" dirty="0"/>
-              <a:t> &amp; </a:t>
-            </a:r>
-            <a:r>
-              <a:rPr lang="en-US" dirty="0" err="1"/>
-              <a:t>ShellRunner</a:t>
-            </a:r>
-            <a:endParaRPr dirty="0"/>
-          </a:p>
-        </p:txBody>
-      </p:sp>
-      <p:sp>
-        <p:nvSpPr>
-          <p:cNvPr id="5" name="화살표: 오른쪽 4">
-            <a:extLst>
-              <a:ext uri="{FF2B5EF4-FFF2-40B4-BE49-F238E27FC236}">
-                <a16:creationId xmlns:a16="http://schemas.microsoft.com/office/drawing/2014/main" id="{F84C07F1-3B13-424A-A2D6-A06BFD93F384}"/>
-              </a:ext>
-            </a:extLst>
-          </p:cNvPr>
-          <p:cNvSpPr/>
-          <p:nvPr/>
-        </p:nvSpPr>
-        <p:spPr>
-          <a:xfrm>
-            <a:off x="5414439" y="3144163"/>
-            <a:ext cx="948333" cy="649800"/>
-          </a:xfrm>
-          <a:prstGeom prst="rightArrow">
-            <a:avLst/>
-          </a:prstGeom>
-        </p:spPr>
-        <p:style>
-          <a:lnRef idx="2">
-            <a:schemeClr val="accent1">
-              <a:shade val="50000"/>
-            </a:schemeClr>
-          </a:lnRef>
-          <a:fillRef idx="1">
-            <a:schemeClr val="accent1"/>
-          </a:fillRef>
-          <a:effectRef idx="0">
-            <a:schemeClr val="accent1"/>
-          </a:effectRef>
-          <a:fontRef idx="minor">
-            <a:schemeClr val="lt1"/>
-          </a:fontRef>
-        </p:style>
-        <p:txBody>
-          <a:bodyPr rtlCol="0" anchor="ctr"/>
-          <a:lstStyle/>
-          <a:p>
-            <a:pPr algn="ctr"/>
-            <a:endParaRPr lang="ko-KR" altLang="en-US"/>
-          </a:p>
-        </p:txBody>
-      </p:sp>
-    </p:spTree>
-    <p:extLst>
-      <p:ext uri="{BB962C8B-B14F-4D97-AF65-F5344CB8AC3E}">
-        <p14:creationId xmlns:p14="http://schemas.microsoft.com/office/powerpoint/2010/main" val="1353755135"/>
-      </p:ext>
-    </p:extLst>
-  </p:cSld>
-  <p:clrMapOvr>
-    <a:masterClrMapping/>
-  </p:clrMapOvr>
-</p:sld>
-</file>
-
-<file path=ppt/slides/slide19.xml><?xml version="1.0" encoding="utf-8"?>
+<file path=ppt/slides/slide17.xml><?xml version="1.0" encoding="utf-8"?>
 <p:sld xmlns:a="http://schemas.openxmlformats.org/drawingml/2006/main" xmlns:r="http://schemas.openxmlformats.org/officeDocument/2006/relationships" xmlns:p="http://schemas.openxmlformats.org/presentationml/2006/main">
   <p:cSld>
     <p:spTree>
@@ -8457,238 +7944,7 @@
 </p:sld>
 </file>
 
-<file path=ppt/slides/slide2.xml><?xml version="1.0" encoding="utf-8"?>
-<p:sld xmlns:a="http://schemas.openxmlformats.org/drawingml/2006/main" xmlns:r="http://schemas.openxmlformats.org/officeDocument/2006/relationships" xmlns:p="http://schemas.openxmlformats.org/presentationml/2006/main">
-  <p:cSld>
-    <p:spTree>
-      <p:nvGrpSpPr>
-        <p:cNvPr id="1" name="Shape 64"/>
-        <p:cNvGrpSpPr/>
-        <p:nvPr/>
-      </p:nvGrpSpPr>
-      <p:grpSpPr>
-        <a:xfrm>
-          <a:off x="0" y="0"/>
-          <a:ext cx="0" cy="0"/>
-          <a:chOff x="0" y="0"/>
-          <a:chExt cx="0" cy="0"/>
-        </a:xfrm>
-      </p:grpSpPr>
-      <p:sp>
-        <p:nvSpPr>
-          <p:cNvPr id="3" name="제목 2">
-            <a:extLst>
-              <a:ext uri="{FF2B5EF4-FFF2-40B4-BE49-F238E27FC236}">
-                <a16:creationId xmlns:a16="http://schemas.microsoft.com/office/drawing/2014/main" id="{DDAF3C9B-7619-45C8-A867-9155A45C71CF}"/>
-              </a:ext>
-            </a:extLst>
-          </p:cNvPr>
-          <p:cNvSpPr>
-            <a:spLocks noGrp="1"/>
-          </p:cNvSpPr>
-          <p:nvPr>
-            <p:ph type="title"/>
-          </p:nvPr>
-        </p:nvSpPr>
-        <p:spPr/>
-        <p:txBody>
-          <a:bodyPr>
-            <a:normAutofit fontScale="90000"/>
-          </a:bodyPr>
-          <a:lstStyle/>
-          <a:p>
-            <a:pPr marL="0" lvl="0" indent="0" rtl="0">
-              <a:lnSpc>
-                <a:spcPct val="90000"/>
-              </a:lnSpc>
-              <a:spcBef>
-                <a:spcPts val="0"/>
-              </a:spcBef>
-              <a:spcAft>
-                <a:spcPts val="0"/>
-              </a:spcAft>
-              <a:buClr>
-                <a:schemeClr val="dk1"/>
-              </a:buClr>
-              <a:buSzPts val="3200"/>
-              <a:buNone/>
-            </a:pPr>
-            <a:r>
-              <a:rPr lang="ko-KR" altLang="en-US"/>
-              <a:t>팀원 소개</a:t>
-            </a:r>
-            <a:endParaRPr lang="ko-KR" altLang="en-US" dirty="0"/>
-          </a:p>
-        </p:txBody>
-      </p:sp>
-      <p:sp>
-        <p:nvSpPr>
-          <p:cNvPr id="4" name="텍스트 개체 틀 3">
-            <a:extLst>
-              <a:ext uri="{FF2B5EF4-FFF2-40B4-BE49-F238E27FC236}">
-                <a16:creationId xmlns:a16="http://schemas.microsoft.com/office/drawing/2014/main" id="{1E65F03D-8C8E-48E4-94E4-3E1899CDAC28}"/>
-              </a:ext>
-            </a:extLst>
-          </p:cNvPr>
-          <p:cNvSpPr>
-            <a:spLocks noGrp="1"/>
-          </p:cNvSpPr>
-          <p:nvPr>
-            <p:ph type="body" idx="1"/>
-          </p:nvPr>
-        </p:nvSpPr>
-        <p:spPr/>
-        <p:txBody>
-          <a:bodyPr/>
-          <a:lstStyle/>
-          <a:p>
-            <a:r>
-              <a:rPr lang="ko-KR" altLang="en-US" dirty="0" err="1"/>
-              <a:t>팀명</a:t>
-            </a:r>
-            <a:endParaRPr lang="en-US" altLang="ko-KR" dirty="0"/>
-          </a:p>
-          <a:p>
-            <a:pPr lvl="1"/>
-            <a:r>
-              <a:rPr lang="en-US" altLang="ko-KR" dirty="0" err="1"/>
-              <a:t>BoyScout</a:t>
-            </a:r>
-            <a:endParaRPr lang="en-US" altLang="ko-KR" dirty="0"/>
-          </a:p>
-          <a:p>
-            <a:pPr lvl="2"/>
-            <a:r>
-              <a:rPr lang="ko-KR" altLang="en-US" sz="1600" i="1" dirty="0">
-                <a:solidFill>
-                  <a:schemeClr val="bg2"/>
-                </a:solidFill>
-              </a:rPr>
-              <a:t>“코드를 처음보다 더 깨끗하게 만들어 놓고 떠나라</a:t>
-            </a:r>
-            <a:r>
-              <a:rPr lang="en-US" altLang="ko-KR" sz="1600" i="1" dirty="0">
-                <a:solidFill>
-                  <a:schemeClr val="bg2"/>
-                </a:solidFill>
-              </a:rPr>
-              <a:t>.”</a:t>
-            </a:r>
-          </a:p>
-          <a:p>
-            <a:r>
-              <a:rPr lang="ko-KR" altLang="en-US" dirty="0"/>
-              <a:t>팀원</a:t>
-            </a:r>
-            <a:endParaRPr lang="en-US" altLang="ko-KR" dirty="0"/>
-          </a:p>
-          <a:p>
-            <a:pPr lvl="1"/>
-            <a:r>
-              <a:rPr lang="en-US" altLang="ko-KR" dirty="0" err="1"/>
-              <a:t>aspiry</a:t>
-            </a:r>
-            <a:r>
-              <a:rPr lang="en-US" altLang="ko-KR" dirty="0"/>
-              <a:t> 	- </a:t>
-            </a:r>
-            <a:r>
-              <a:rPr lang="ko-KR" altLang="en-US" dirty="0"/>
-              <a:t>정혜진님</a:t>
-            </a:r>
-          </a:p>
-          <a:p>
-            <a:pPr lvl="1"/>
-            <a:r>
-              <a:rPr lang="en-US" altLang="ko-KR" dirty="0"/>
-              <a:t>sh1lee 	- </a:t>
-            </a:r>
-            <a:r>
-              <a:rPr lang="ko-KR" altLang="en-US" dirty="0"/>
-              <a:t>이승현님</a:t>
-            </a:r>
-          </a:p>
-          <a:p>
-            <a:pPr lvl="1"/>
-            <a:r>
-              <a:rPr lang="en-US" altLang="ko-KR" dirty="0" err="1"/>
-              <a:t>liebeguso</a:t>
-            </a:r>
-            <a:r>
-              <a:rPr lang="en-US" altLang="ko-KR" dirty="0"/>
-              <a:t> 	- </a:t>
-            </a:r>
-            <a:r>
-              <a:rPr lang="ko-KR" altLang="en-US" dirty="0" err="1"/>
-              <a:t>박세운님</a:t>
-            </a:r>
-            <a:endParaRPr lang="ko-KR" altLang="en-US" dirty="0"/>
-          </a:p>
-          <a:p>
-            <a:pPr lvl="1"/>
-            <a:r>
-              <a:rPr lang="en-US" altLang="ko-KR" dirty="0"/>
-              <a:t>hh1012 	- </a:t>
-            </a:r>
-            <a:r>
-              <a:rPr lang="ko-KR" altLang="en-US" dirty="0" err="1"/>
-              <a:t>허훈님</a:t>
-            </a:r>
-            <a:endParaRPr lang="ko-KR" altLang="en-US" dirty="0"/>
-          </a:p>
-          <a:p>
-            <a:pPr lvl="1"/>
-            <a:r>
-              <a:rPr lang="en-US" altLang="ko-KR" dirty="0" err="1"/>
-              <a:t>uiyangco</a:t>
-            </a:r>
-            <a:r>
-              <a:rPr lang="en-US" altLang="ko-KR" dirty="0"/>
-              <a:t> 	- </a:t>
-            </a:r>
-            <a:r>
-              <a:rPr lang="ko-KR" altLang="en-US" dirty="0"/>
-              <a:t>정진섭님</a:t>
-            </a:r>
-          </a:p>
-          <a:p>
-            <a:pPr lvl="1"/>
-            <a:r>
-              <a:rPr lang="en-US" altLang="ko-KR" dirty="0" err="1"/>
-              <a:t>ehju</a:t>
-            </a:r>
-            <a:r>
-              <a:rPr lang="en-US" altLang="ko-KR" dirty="0"/>
-              <a:t> 		- </a:t>
-            </a:r>
-            <a:r>
-              <a:rPr lang="ko-KR" altLang="en-US" dirty="0"/>
-              <a:t>주은혜님</a:t>
-            </a:r>
-            <a:endParaRPr lang="en-US" altLang="ko-KR" dirty="0"/>
-          </a:p>
-          <a:p>
-            <a:pPr marL="114300" indent="0">
-              <a:buNone/>
-            </a:pPr>
-            <a:endParaRPr lang="en-US" altLang="ko-KR" dirty="0"/>
-          </a:p>
-        </p:txBody>
-      </p:sp>
-    </p:spTree>
-    <p:extLst>
-      <p:ext uri="{BB962C8B-B14F-4D97-AF65-F5344CB8AC3E}">
-        <p14:creationId xmlns:p14="http://schemas.microsoft.com/office/powerpoint/2010/main" val="1934369377"/>
-      </p:ext>
-    </p:extLst>
-  </p:cSld>
-  <p:clrMapOvr>
-    <a:masterClrMapping/>
-  </p:clrMapOvr>
-</p:sld>
-</file>
-
-<file path=ppt/slides/slide20.xml><?xml version="1.0" encoding="utf-8"?>
+<file path=ppt/slides/slide18.xml><?xml version="1.0" encoding="utf-8"?>
 <p:sld xmlns:a="http://schemas.openxmlformats.org/drawingml/2006/main" xmlns:r="http://schemas.openxmlformats.org/officeDocument/2006/relationships" xmlns:p="http://schemas.openxmlformats.org/presentationml/2006/main">
   <p:cSld>
     <p:spTree>
@@ -8752,12 +8008,8 @@
               <a:buNone/>
             </a:pPr>
             <a:r>
-              <a:rPr lang="en-US" dirty="0" err="1"/>
-              <a:t>Singletone</a:t>
-            </a:r>
-            <a:r>
               <a:rPr lang="en-US" dirty="0"/>
-              <a:t> Pattern</a:t>
+              <a:t>Singleton Pattern</a:t>
             </a:r>
             <a:endParaRPr dirty="0"/>
           </a:p>
@@ -8822,7 +8074,7 @@
 </p:sld>
 </file>
 
-<file path=ppt/slides/slide21.xml><?xml version="1.0" encoding="utf-8"?>
+<file path=ppt/slides/slide19.xml><?xml version="1.0" encoding="utf-8"?>
 <p:sld xmlns:a="http://schemas.openxmlformats.org/drawingml/2006/main" xmlns:r="http://schemas.openxmlformats.org/officeDocument/2006/relationships" xmlns:p="http://schemas.openxmlformats.org/presentationml/2006/main">
   <p:cSld>
     <p:spTree>
@@ -8952,7 +8204,234 @@
 </p:sld>
 </file>
 
-<file path=ppt/slides/slide22.xml><?xml version="1.0" encoding="utf-8"?>
+<file path=ppt/slides/slide2.xml><?xml version="1.0" encoding="utf-8"?>
+<p:sld xmlns:a="http://schemas.openxmlformats.org/drawingml/2006/main" xmlns:r="http://schemas.openxmlformats.org/officeDocument/2006/relationships" xmlns:p="http://schemas.openxmlformats.org/presentationml/2006/main">
+  <p:cSld>
+    <p:spTree>
+      <p:nvGrpSpPr>
+        <p:cNvPr id="1" name="Shape 64"/>
+        <p:cNvGrpSpPr/>
+        <p:nvPr/>
+      </p:nvGrpSpPr>
+      <p:grpSpPr>
+        <a:xfrm>
+          <a:off x="0" y="0"/>
+          <a:ext cx="0" cy="0"/>
+          <a:chOff x="0" y="0"/>
+          <a:chExt cx="0" cy="0"/>
+        </a:xfrm>
+      </p:grpSpPr>
+      <p:sp>
+        <p:nvSpPr>
+          <p:cNvPr id="3" name="제목 2">
+            <a:extLst>
+              <a:ext uri="{FF2B5EF4-FFF2-40B4-BE49-F238E27FC236}">
+                <a16:creationId xmlns:a16="http://schemas.microsoft.com/office/drawing/2014/main" id="{DDAF3C9B-7619-45C8-A867-9155A45C71CF}"/>
+              </a:ext>
+            </a:extLst>
+          </p:cNvPr>
+          <p:cNvSpPr>
+            <a:spLocks noGrp="1"/>
+          </p:cNvSpPr>
+          <p:nvPr>
+            <p:ph type="title"/>
+          </p:nvPr>
+        </p:nvSpPr>
+        <p:spPr/>
+        <p:txBody>
+          <a:bodyPr>
+            <a:normAutofit fontScale="90000"/>
+          </a:bodyPr>
+          <a:lstStyle/>
+          <a:p>
+            <a:pPr marL="0" lvl="0" indent="0" rtl="0">
+              <a:lnSpc>
+                <a:spcPct val="90000"/>
+              </a:lnSpc>
+              <a:spcBef>
+                <a:spcPts val="0"/>
+              </a:spcBef>
+              <a:spcAft>
+                <a:spcPts val="0"/>
+              </a:spcAft>
+              <a:buClr>
+                <a:schemeClr val="dk1"/>
+              </a:buClr>
+              <a:buSzPts val="3200"/>
+              <a:buNone/>
+            </a:pPr>
+            <a:r>
+              <a:rPr lang="ko-KR" altLang="en-US"/>
+              <a:t>팀원 소개</a:t>
+            </a:r>
+            <a:endParaRPr lang="ko-KR" altLang="en-US" dirty="0"/>
+          </a:p>
+        </p:txBody>
+      </p:sp>
+      <p:sp>
+        <p:nvSpPr>
+          <p:cNvPr id="4" name="텍스트 개체 틀 3">
+            <a:extLst>
+              <a:ext uri="{FF2B5EF4-FFF2-40B4-BE49-F238E27FC236}">
+                <a16:creationId xmlns:a16="http://schemas.microsoft.com/office/drawing/2014/main" id="{1E65F03D-8C8E-48E4-94E4-3E1899CDAC28}"/>
+              </a:ext>
+            </a:extLst>
+          </p:cNvPr>
+          <p:cNvSpPr>
+            <a:spLocks noGrp="1"/>
+          </p:cNvSpPr>
+          <p:nvPr>
+            <p:ph type="body" idx="1"/>
+          </p:nvPr>
+        </p:nvSpPr>
+        <p:spPr/>
+        <p:txBody>
+          <a:bodyPr>
+            <a:normAutofit/>
+          </a:bodyPr>
+          <a:lstStyle/>
+          <a:p>
+            <a:r>
+              <a:rPr lang="ko-KR" altLang="en-US" sz="3200" dirty="0" err="1"/>
+              <a:t>팀명</a:t>
+            </a:r>
+            <a:endParaRPr lang="en-US" altLang="ko-KR" sz="3200" dirty="0"/>
+          </a:p>
+          <a:p>
+            <a:pPr lvl="1"/>
+            <a:r>
+              <a:rPr lang="en-US" altLang="ko-KR" sz="2800" dirty="0" err="1"/>
+              <a:t>BoyScout</a:t>
+            </a:r>
+            <a:endParaRPr lang="en-US" altLang="ko-KR" sz="2800" dirty="0"/>
+          </a:p>
+          <a:p>
+            <a:pPr lvl="2"/>
+            <a:r>
+              <a:rPr lang="ko-KR" altLang="en-US" i="1" dirty="0">
+                <a:solidFill>
+                  <a:srgbClr val="0070C0"/>
+                </a:solidFill>
+              </a:rPr>
+              <a:t>“코드를 처음보다 더 깨끗하게 만들어 놓고 떠나라</a:t>
+            </a:r>
+            <a:r>
+              <a:rPr lang="en-US" altLang="ko-KR" i="1" dirty="0">
+                <a:solidFill>
+                  <a:srgbClr val="0070C0"/>
+                </a:solidFill>
+              </a:rPr>
+              <a:t>.”</a:t>
+            </a:r>
+          </a:p>
+          <a:p>
+            <a:r>
+              <a:rPr lang="ko-KR" altLang="en-US" sz="3200" dirty="0"/>
+              <a:t>팀원</a:t>
+            </a:r>
+            <a:endParaRPr lang="en-US" altLang="ko-KR" sz="3200" dirty="0"/>
+          </a:p>
+          <a:p>
+            <a:pPr lvl="1"/>
+            <a:r>
+              <a:rPr lang="en-US" altLang="ko-KR" sz="2800" dirty="0" err="1"/>
+              <a:t>aspiry</a:t>
+            </a:r>
+            <a:r>
+              <a:rPr lang="en-US" altLang="ko-KR" sz="2800" dirty="0"/>
+              <a:t> 	- </a:t>
+            </a:r>
+            <a:r>
+              <a:rPr lang="ko-KR" altLang="en-US" sz="2800" dirty="0"/>
+              <a:t>정혜진님</a:t>
+            </a:r>
+          </a:p>
+          <a:p>
+            <a:pPr lvl="1"/>
+            <a:r>
+              <a:rPr lang="en-US" altLang="ko-KR" sz="2800" dirty="0"/>
+              <a:t>sh1lee 	- </a:t>
+            </a:r>
+            <a:r>
+              <a:rPr lang="ko-KR" altLang="en-US" sz="2800" dirty="0"/>
+              <a:t>이승현님</a:t>
+            </a:r>
+          </a:p>
+          <a:p>
+            <a:pPr lvl="1"/>
+            <a:r>
+              <a:rPr lang="en-US" altLang="ko-KR" sz="2800" dirty="0" err="1"/>
+              <a:t>liebeguso</a:t>
+            </a:r>
+            <a:r>
+              <a:rPr lang="en-US" altLang="ko-KR" sz="2800" dirty="0"/>
+              <a:t> 	- </a:t>
+            </a:r>
+            <a:r>
+              <a:rPr lang="ko-KR" altLang="en-US" sz="2800" dirty="0" err="1"/>
+              <a:t>박세운님</a:t>
+            </a:r>
+            <a:endParaRPr lang="ko-KR" altLang="en-US" sz="2800" dirty="0"/>
+          </a:p>
+          <a:p>
+            <a:pPr lvl="1"/>
+            <a:r>
+              <a:rPr lang="en-US" altLang="ko-KR" sz="2800" dirty="0"/>
+              <a:t>hh1012 	- </a:t>
+            </a:r>
+            <a:r>
+              <a:rPr lang="ko-KR" altLang="en-US" sz="2800" dirty="0" err="1"/>
+              <a:t>허훈님</a:t>
+            </a:r>
+            <a:endParaRPr lang="ko-KR" altLang="en-US" sz="2800" dirty="0"/>
+          </a:p>
+          <a:p>
+            <a:pPr lvl="1"/>
+            <a:r>
+              <a:rPr lang="en-US" altLang="ko-KR" sz="2800" dirty="0" err="1"/>
+              <a:t>uiyangco</a:t>
+            </a:r>
+            <a:r>
+              <a:rPr lang="en-US" altLang="ko-KR" sz="2800" dirty="0"/>
+              <a:t> 	- </a:t>
+            </a:r>
+            <a:r>
+              <a:rPr lang="ko-KR" altLang="en-US" sz="2800" dirty="0"/>
+              <a:t>정진섭님</a:t>
+            </a:r>
+          </a:p>
+          <a:p>
+            <a:pPr lvl="1"/>
+            <a:r>
+              <a:rPr lang="en-US" altLang="ko-KR" sz="2800" dirty="0" err="1"/>
+              <a:t>ehju</a:t>
+            </a:r>
+            <a:r>
+              <a:rPr lang="en-US" altLang="ko-KR" sz="2800" dirty="0"/>
+              <a:t> 		- </a:t>
+            </a:r>
+            <a:r>
+              <a:rPr lang="ko-KR" altLang="en-US" sz="2800" dirty="0"/>
+              <a:t>주은혜님</a:t>
+            </a:r>
+            <a:endParaRPr lang="en-US" altLang="ko-KR" sz="2800" dirty="0"/>
+          </a:p>
+        </p:txBody>
+      </p:sp>
+    </p:spTree>
+    <p:extLst>
+      <p:ext uri="{BB962C8B-B14F-4D97-AF65-F5344CB8AC3E}">
+        <p14:creationId xmlns:p14="http://schemas.microsoft.com/office/powerpoint/2010/main" val="1934369377"/>
+      </p:ext>
+    </p:extLst>
+  </p:cSld>
+  <p:clrMapOvr>
+    <a:masterClrMapping/>
+  </p:clrMapOvr>
+</p:sld>
+</file>
+
+<file path=ppt/slides/slide20.xml><?xml version="1.0" encoding="utf-8"?>
 <p:sld xmlns:a="http://schemas.openxmlformats.org/drawingml/2006/main" xmlns:r="http://schemas.openxmlformats.org/officeDocument/2006/relationships" xmlns:p="http://schemas.openxmlformats.org/presentationml/2006/main">
   <p:cSld>
     <p:spTree>
@@ -9035,7 +8514,7 @@
 </p:sld>
 </file>
 
-<file path=ppt/slides/slide23.xml><?xml version="1.0" encoding="utf-8"?>
+<file path=ppt/slides/slide21.xml><?xml version="1.0" encoding="utf-8"?>
 <p:sld xmlns:a="http://schemas.openxmlformats.org/drawingml/2006/main" xmlns:r="http://schemas.openxmlformats.org/officeDocument/2006/relationships" xmlns:p="http://schemas.openxmlformats.org/presentationml/2006/main">
   <p:cSld>
     <p:spTree>
@@ -9132,7 +8611,7 @@
 </p:sld>
 </file>
 
-<file path=ppt/slides/slide24.xml><?xml version="1.0" encoding="utf-8"?>
+<file path=ppt/slides/slide22.xml><?xml version="1.0" encoding="utf-8"?>
 <p:sld xmlns:a="http://schemas.openxmlformats.org/drawingml/2006/main" xmlns:r="http://schemas.openxmlformats.org/officeDocument/2006/relationships" xmlns:p="http://schemas.openxmlformats.org/presentationml/2006/main">
   <p:cSld>
     <p:spTree>

</xml_diff>